<commit_message>
Add poster comments 9/19
</commit_message>
<xml_diff>
--- a/ConferenceMaterials/CRCSimPoster.pptx
+++ b/ConferenceMaterials/CRCSimPoster.pptx
@@ -211,7 +211,7 @@
           <a:p>
             <a:fld id="{4EE9FA2A-A7E6-41D0-BB84-0AFCD146FB8A}" type="datetimeFigureOut">
               <a:rPr lang="LID4096" smtClean="0"/>
-              <a:t>9/12/24</a:t>
+              <a:t>9/19/24</a:t>
             </a:fld>
             <a:endParaRPr lang="LID4096"/>
           </a:p>
@@ -705,7 +705,7 @@
           <a:p>
             <a:fld id="{1ECD7612-8A31-47AD-A3A1-315987FDDB64}" type="datetimeFigureOut">
               <a:rPr lang="LID4096" smtClean="0"/>
-              <a:t>9/12/24</a:t>
+              <a:t>9/19/24</a:t>
             </a:fld>
             <a:endParaRPr lang="LID4096"/>
           </a:p>
@@ -875,7 +875,7 @@
           <a:p>
             <a:fld id="{1ECD7612-8A31-47AD-A3A1-315987FDDB64}" type="datetimeFigureOut">
               <a:rPr lang="LID4096" smtClean="0"/>
-              <a:t>9/12/24</a:t>
+              <a:t>9/19/24</a:t>
             </a:fld>
             <a:endParaRPr lang="LID4096"/>
           </a:p>
@@ -1055,7 +1055,7 @@
           <a:p>
             <a:fld id="{1ECD7612-8A31-47AD-A3A1-315987FDDB64}" type="datetimeFigureOut">
               <a:rPr lang="LID4096" smtClean="0"/>
-              <a:t>9/12/24</a:t>
+              <a:t>9/19/24</a:t>
             </a:fld>
             <a:endParaRPr lang="LID4096"/>
           </a:p>
@@ -1225,7 +1225,7 @@
           <a:p>
             <a:fld id="{1ECD7612-8A31-47AD-A3A1-315987FDDB64}" type="datetimeFigureOut">
               <a:rPr lang="LID4096" smtClean="0"/>
-              <a:t>9/12/24</a:t>
+              <a:t>9/19/24</a:t>
             </a:fld>
             <a:endParaRPr lang="LID4096"/>
           </a:p>
@@ -1471,7 +1471,7 @@
           <a:p>
             <a:fld id="{1ECD7612-8A31-47AD-A3A1-315987FDDB64}" type="datetimeFigureOut">
               <a:rPr lang="LID4096" smtClean="0"/>
-              <a:t>9/12/24</a:t>
+              <a:t>9/19/24</a:t>
             </a:fld>
             <a:endParaRPr lang="LID4096"/>
           </a:p>
@@ -1703,7 +1703,7 @@
           <a:p>
             <a:fld id="{1ECD7612-8A31-47AD-A3A1-315987FDDB64}" type="datetimeFigureOut">
               <a:rPr lang="LID4096" smtClean="0"/>
-              <a:t>9/12/24</a:t>
+              <a:t>9/19/24</a:t>
             </a:fld>
             <a:endParaRPr lang="LID4096"/>
           </a:p>
@@ -2070,7 +2070,7 @@
           <a:p>
             <a:fld id="{1ECD7612-8A31-47AD-A3A1-315987FDDB64}" type="datetimeFigureOut">
               <a:rPr lang="LID4096" smtClean="0"/>
-              <a:t>9/12/24</a:t>
+              <a:t>9/19/24</a:t>
             </a:fld>
             <a:endParaRPr lang="LID4096"/>
           </a:p>
@@ -2188,7 +2188,7 @@
           <a:p>
             <a:fld id="{1ECD7612-8A31-47AD-A3A1-315987FDDB64}" type="datetimeFigureOut">
               <a:rPr lang="LID4096" smtClean="0"/>
-              <a:t>9/12/24</a:t>
+              <a:t>9/19/24</a:t>
             </a:fld>
             <a:endParaRPr lang="LID4096"/>
           </a:p>
@@ -2283,7 +2283,7 @@
           <a:p>
             <a:fld id="{1ECD7612-8A31-47AD-A3A1-315987FDDB64}" type="datetimeFigureOut">
               <a:rPr lang="LID4096" smtClean="0"/>
-              <a:t>9/12/24</a:t>
+              <a:t>9/19/24</a:t>
             </a:fld>
             <a:endParaRPr lang="LID4096"/>
           </a:p>
@@ -2560,7 +2560,7 @@
           <a:p>
             <a:fld id="{1ECD7612-8A31-47AD-A3A1-315987FDDB64}" type="datetimeFigureOut">
               <a:rPr lang="LID4096" smtClean="0"/>
-              <a:t>9/12/24</a:t>
+              <a:t>9/19/24</a:t>
             </a:fld>
             <a:endParaRPr lang="LID4096"/>
           </a:p>
@@ -2817,7 +2817,7 @@
           <a:p>
             <a:fld id="{1ECD7612-8A31-47AD-A3A1-315987FDDB64}" type="datetimeFigureOut">
               <a:rPr lang="LID4096" smtClean="0"/>
-              <a:t>9/12/24</a:t>
+              <a:t>9/19/24</a:t>
             </a:fld>
             <a:endParaRPr lang="LID4096"/>
           </a:p>
@@ -3030,7 +3030,7 @@
           <a:p>
             <a:fld id="{1ECD7612-8A31-47AD-A3A1-315987FDDB64}" type="datetimeFigureOut">
               <a:rPr lang="LID4096" smtClean="0"/>
-              <a:t>9/12/24</a:t>
+              <a:t>9/19/24</a:t>
             </a:fld>
             <a:endParaRPr lang="LID4096"/>
           </a:p>
@@ -3512,7 +3512,7 @@
                   <a:schemeClr val="bg1"/>
                 </a:solidFill>
               </a:rPr>
-              <a:t>yan O’Dea MS (1), Benjamin P. Linas MD, MPH (1, 2), Laura White Ph.D. (3), </a:t>
+              <a:t>yan O’Dea MS (1), Benjamin P. Linas MD, MPH (1, 2), Laura F White Ph.D. (3), </a:t>
             </a:r>
             <a:br>
               <a:rPr lang="en-US" sz="4400" dirty="0">
@@ -3522,20 +3522,12 @@
               </a:rPr>
             </a:br>
             <a:r>
-              <a:rPr lang="en-US" sz="4400" dirty="0">
+              <a:rPr lang="en-US" sz="4400">
                 <a:solidFill>
                   <a:schemeClr val="bg1"/>
                 </a:solidFill>
               </a:rPr>
-              <a:t>Joshua </a:t>
-            </a:r>
-            <a:r>
-              <a:rPr lang="en-US" sz="4400" dirty="0" err="1">
-                <a:solidFill>
-                  <a:schemeClr val="bg1"/>
-                </a:solidFill>
-              </a:rPr>
-              <a:t>Barocas</a:t>
+              <a:t>Joshua A Barocas</a:t>
             </a:r>
             <a:r>
               <a:rPr lang="en-US" sz="4400" dirty="0">
@@ -3586,7 +3578,7 @@
                   <a:schemeClr val="bg1"/>
                 </a:solidFill>
               </a:rPr>
-              <a:t>1) Boston Medical Center, (2) Boston University School of Medicine, (3) Boston University School of Public Health, (4) University of Colorado School of Medicine-Divisions of General Internal Medicine and Infectious Diseases, (4) Massachusetts General Hospital, (6) Harvard Medical School</a:t>
+              <a:t>1) Boston Medical Center, (2) Boston University School of Medicine, (3) Boston University School of Public Health, (4) University of Colorado School of Medicine-Divisions of General Internal Medicine and Infectious Diseases, (5) Massachusetts General Hospital, (6) Harvard Medical School</a:t>
             </a:r>
           </a:p>
         </p:txBody>
@@ -3606,7 +3598,7 @@
         <p:spPr>
           <a:xfrm>
             <a:off x="507206" y="7716100"/>
-            <a:ext cx="14180344" cy="10754780"/>
+            <a:ext cx="14180344" cy="5173284"/>
           </a:xfrm>
           <a:prstGeom prst="roundRect">
             <a:avLst>
@@ -3650,7 +3642,7 @@
               <a:rPr lang="en-US" sz="7200" b="1" dirty="0">
                 <a:latin typeface="Century Gothic" panose="020B0502020202020204" pitchFamily="34" charset="0"/>
               </a:rPr>
-              <a:t>Abstract</a:t>
+              <a:t>Background</a:t>
             </a:r>
           </a:p>
           <a:p>
@@ -3660,7 +3652,8 @@
             </a:pPr>
             <a:r>
               <a:rPr lang="en-US" sz="4000" dirty="0">
-                <a:latin typeface="Century Gothic" panose="020B0502020202020204" pitchFamily="34" charset="0"/>
+                <a:latin typeface="Calibri" panose="020F0502020204030204" pitchFamily="34" charset="0"/>
+                <a:cs typeface="Calibri" panose="020F0502020204030204" pitchFamily="34" charset="0"/>
               </a:rPr>
               <a:t>This research aims to </a:t>
             </a:r>
@@ -3669,70 +3662,11 @@
                 <a:solidFill>
                   <a:schemeClr val="bg1"/>
                 </a:solidFill>
-                <a:latin typeface="Century Gothic" panose="020B0502020202020204" pitchFamily="34" charset="0"/>
+                <a:latin typeface="Calibri" panose="020F0502020204030204" pitchFamily="34" charset="0"/>
+                <a:cs typeface="Calibri" panose="020F0502020204030204" pitchFamily="34" charset="0"/>
               </a:rPr>
-              <a:t>improve “capture-recapture” analysis - a method for estimating the number of people who use opioids living in a jurisdiction.</a:t>
-            </a:r>
-          </a:p>
-          <a:p>
-            <a:pPr marL="857250" indent="-857250">
-              <a:buFont typeface="Arial" panose="020B0604020202020204" pitchFamily="34" charset="0"/>
-              <a:buChar char="•"/>
-            </a:pPr>
-            <a:r>
-              <a:rPr lang="en-US" sz="4000" dirty="0">
-                <a:solidFill>
-                  <a:schemeClr val="bg1"/>
-                </a:solidFill>
-                <a:latin typeface="Century Gothic" panose="020B0502020202020204" pitchFamily="34" charset="0"/>
-              </a:rPr>
-              <a:t>We created a simulated population with a given prevalence of opioid use. </a:t>
-            </a:r>
-          </a:p>
-          <a:p>
-            <a:pPr marL="857250" indent="-857250">
-              <a:buFont typeface="Arial" panose="020B0604020202020204" pitchFamily="34" charset="0"/>
-              <a:buChar char="•"/>
-            </a:pPr>
-            <a:r>
-              <a:rPr lang="en-US" sz="4000" dirty="0">
-                <a:solidFill>
-                  <a:schemeClr val="bg1"/>
-                </a:solidFill>
-                <a:latin typeface="Century Gothic" panose="020B0502020202020204" pitchFamily="34" charset="0"/>
-              </a:rPr>
-              <a:t>We simulate a population of people who use opioids along with their “capture” of data in administrative records.</a:t>
-            </a:r>
-          </a:p>
-          <a:p>
-            <a:pPr marL="857250" indent="-857250">
-              <a:buFont typeface="Arial" panose="020B0604020202020204" pitchFamily="34" charset="0"/>
-              <a:buChar char="•"/>
-            </a:pPr>
-            <a:r>
-              <a:rPr lang="en-US" sz="4000" dirty="0">
-                <a:solidFill>
-                  <a:schemeClr val="bg1"/>
-                </a:solidFill>
-                <a:latin typeface="Century Gothic" panose="020B0502020202020204" pitchFamily="34" charset="0"/>
-              </a:rPr>
-              <a:t>We then performed the ”capture-recapture” analysis on the simulated data. and compared estimated prevalence to underlying true prevalence.</a:t>
-            </a:r>
-          </a:p>
-          <a:p>
-            <a:pPr marL="857250" indent="-857250">
-              <a:buFont typeface="Arial" panose="020B0604020202020204" pitchFamily="34" charset="0"/>
-              <a:buChar char="•"/>
-            </a:pPr>
-            <a:r>
-              <a:rPr lang="en-US" sz="4000" dirty="0">
-                <a:latin typeface="Century Gothic" panose="020B0502020202020204" pitchFamily="34" charset="0"/>
-              </a:rPr>
-              <a:t>Through contrasting different model selection processes, we enhance the precision of OUD prevalence estimates</a:t>
-            </a:r>
-            <a:endParaRPr lang="en-US" sz="4000" b="1" dirty="0">
-              <a:latin typeface="Century Gothic" panose="020B0502020202020204" pitchFamily="34" charset="0"/>
-            </a:endParaRPr>
+              <a:t>improve “capture-recapture” analysis - a method for estimating the number of people who use opioids living in a jurisdiction while addressing underreporting in surveillance, particularly in demographics where data may be increasingly sparse.</a:t>
+            </a:r>
           </a:p>
         </p:txBody>
       </p:sp>
@@ -3893,8 +3827,8 @@
         </p:nvSpPr>
         <p:spPr>
           <a:xfrm>
-            <a:off x="507206" y="18799390"/>
-            <a:ext cx="14180344" cy="7291490"/>
+            <a:off x="507206" y="19410218"/>
+            <a:ext cx="14180344" cy="6680662"/>
           </a:xfrm>
           <a:prstGeom prst="roundRect">
             <a:avLst>
@@ -3940,6 +3874,13 @@
               </a:rPr>
               <a:t>Results</a:t>
             </a:r>
+            <a:endParaRPr lang="en-US" sz="4000" dirty="0">
+              <a:solidFill>
+                <a:schemeClr val="bg1"/>
+              </a:solidFill>
+              <a:latin typeface="Calibri" panose="020F0502020204030204" pitchFamily="34" charset="0"/>
+              <a:cs typeface="Calibri" panose="020F0502020204030204" pitchFamily="34" charset="0"/>
+            </a:endParaRPr>
           </a:p>
           <a:p>
             <a:pPr marL="857250" indent="-857250">
@@ -3951,9 +3892,10 @@
                 <a:solidFill>
                   <a:schemeClr val="bg1"/>
                 </a:solidFill>
-                <a:latin typeface="Century Gothic" panose="020B0502020202020204" pitchFamily="34" charset="0"/>
+                <a:latin typeface="Calibri" panose="020F0502020204030204" pitchFamily="34" charset="0"/>
+                <a:cs typeface="Calibri" panose="020F0502020204030204" pitchFamily="34" charset="0"/>
               </a:rPr>
-              <a:t>When populations are large, we can recover the ground truth within 1%.</a:t>
+              <a:t>As populations become small, single point estimation using capture recapture loses accuracy showing a potential lack of robustness with respect to capture histories and population size; however, this lack of robustness can be addressed through taking the mean of bootstrapped estimates.</a:t>
             </a:r>
           </a:p>
           <a:p>
@@ -3966,24 +3908,10 @@
                 <a:solidFill>
                   <a:schemeClr val="bg1"/>
                 </a:solidFill>
-                <a:latin typeface="Century Gothic" panose="020B0502020202020204" pitchFamily="34" charset="0"/>
+                <a:latin typeface="Calibri" panose="020F0502020204030204" pitchFamily="34" charset="0"/>
+                <a:cs typeface="Calibri" panose="020F0502020204030204" pitchFamily="34" charset="0"/>
               </a:rPr>
-              <a:t>When populations become small, single point estimation using capture recapture loses accuracy showing a potential lack of robustness with respect to capture histories and population size.</a:t>
-            </a:r>
-          </a:p>
-          <a:p>
-            <a:pPr marL="857250" indent="-857250">
-              <a:buFont typeface="Arial" panose="020B0604020202020204" pitchFamily="34" charset="0"/>
-              <a:buChar char="•"/>
-            </a:pPr>
-            <a:r>
-              <a:rPr lang="en-US" sz="4000" dirty="0">
-                <a:solidFill>
-                  <a:schemeClr val="bg1"/>
-                </a:solidFill>
-                <a:latin typeface="Century Gothic" panose="020B0502020202020204" pitchFamily="34" charset="0"/>
-              </a:rPr>
-              <a:t>We attempt to address this lack of robustness through bootstrapping, which allows us to recover the ground truth</a:t>
+              <a:t>This indicates that, with bootstrap methods, we can recover the true prevalence of opioid use disorder in situations where data on certain demographics is sparse.</a:t>
             </a:r>
           </a:p>
         </p:txBody>
@@ -4068,7 +3996,7 @@
                 <a:latin typeface="Calibri" panose="020F0502020204030204" pitchFamily="34" charset="0"/>
                 <a:ea typeface="Times New Roman" panose="02020603050405020304" pitchFamily="18" charset="0"/>
               </a:rPr>
-              <a:t>CRC is a valuable method for estimating the hidden prevalence of OUD, but its effectiveness depends on selecting appropriate models based on available data. Through contrasting different approaches, we highlight the estimation process for strata-specific prevalence and interpret strengths and limitations of common model selection strategies, enhancing the precision of OUD prevalence assessments for uniquely stratified data.</a:t>
+              <a:t>CRC is a valuable method for estimating the hidden prevalence of OUD, but its effectiveness depends on selecting appropriate models based on available data. Through contrasting different approaches, we highlight the estimation process for strata-specific prevalence and interpret strengths and limitations of common model selection strategies, enhancing the precision of OUD prevalence assessments for uniquely stratified and captured data.</a:t>
             </a:r>
             <a:endParaRPr lang="en-US" sz="4000" dirty="0">
               <a:solidFill>
@@ -4189,6 +4117,99 @@
           </a:prstGeom>
         </p:spPr>
       </p:pic>
+      <p:sp>
+        <p:nvSpPr>
+          <p:cNvPr id="5" name="Rounded Rectangle 75">
+            <a:extLst>
+              <a:ext uri="{FF2B5EF4-FFF2-40B4-BE49-F238E27FC236}">
+                <a16:creationId xmlns:a16="http://schemas.microsoft.com/office/drawing/2014/main" id="{2C5224A0-9DC9-0BD1-2D3C-E5C8DD8685AF}"/>
+              </a:ext>
+            </a:extLst>
+          </p:cNvPr>
+          <p:cNvSpPr/>
+          <p:nvPr/>
+        </p:nvSpPr>
+        <p:spPr>
+          <a:xfrm>
+            <a:off x="507206" y="13339814"/>
+            <a:ext cx="14180344" cy="5619974"/>
+          </a:xfrm>
+          <a:prstGeom prst="roundRect">
+            <a:avLst>
+              <a:gd name="adj" fmla="val 3206"/>
+            </a:avLst>
+          </a:prstGeom>
+          <a:solidFill>
+            <a:srgbClr val="003771"/>
+          </a:solidFill>
+          <a:ln w="76200">
+            <a:solidFill>
+              <a:srgbClr val="3D9BE9"/>
+            </a:solidFill>
+          </a:ln>
+        </p:spPr>
+        <p:style>
+          <a:lnRef idx="2">
+            <a:schemeClr val="accent1">
+              <a:shade val="50000"/>
+            </a:schemeClr>
+          </a:lnRef>
+          <a:fillRef idx="1">
+            <a:schemeClr val="accent1"/>
+          </a:fillRef>
+          <a:effectRef idx="0">
+            <a:schemeClr val="accent1"/>
+          </a:effectRef>
+          <a:fontRef idx="minor">
+            <a:schemeClr val="lt1"/>
+          </a:fontRef>
+        </p:style>
+        <p:txBody>
+          <a:bodyPr rtlCol="0" anchor="ctr"/>
+          <a:lstStyle>
+            <a:defPPr>
+              <a:defRPr kern="1200" smtId="4294967295"/>
+            </a:defPPr>
+          </a:lstStyle>
+          <a:p>
+            <a:r>
+              <a:rPr lang="en-US" sz="7200" b="1" dirty="0">
+                <a:latin typeface="Century Gothic" panose="020B0502020202020204" pitchFamily="34" charset="0"/>
+              </a:rPr>
+              <a:t>Methods</a:t>
+            </a:r>
+          </a:p>
+          <a:p>
+            <a:pPr marL="857250" indent="-857250">
+              <a:buFont typeface="Arial" panose="020B0604020202020204" pitchFamily="34" charset="0"/>
+              <a:buChar char="•"/>
+            </a:pPr>
+            <a:r>
+              <a:rPr lang="en-US" sz="4000" dirty="0">
+                <a:latin typeface="Calibri" panose="020F0502020204030204" pitchFamily="34" charset="0"/>
+                <a:cs typeface="Calibri" panose="020F0502020204030204" pitchFamily="34" charset="0"/>
+              </a:rPr>
+              <a:t>A population was created with simulated capture histories and demographic information, then we examined the accuracy of estimates between Poisson and Negative Binomial (NB) distributions with log-linear models.</a:t>
+            </a:r>
+          </a:p>
+          <a:p>
+            <a:pPr marL="857250" indent="-857250">
+              <a:buFont typeface="Arial" panose="020B0604020202020204" pitchFamily="34" charset="0"/>
+              <a:buChar char="•"/>
+            </a:pPr>
+            <a:r>
+              <a:rPr lang="en-US" sz="4000" dirty="0">
+                <a:solidFill>
+                  <a:schemeClr val="bg1"/>
+                </a:solidFill>
+                <a:latin typeface="Calibri" panose="020F0502020204030204" pitchFamily="34" charset="0"/>
+                <a:cs typeface="Calibri" panose="020F0502020204030204" pitchFamily="34" charset="0"/>
+              </a:rPr>
+              <a:t>Model efficacy was benchmarked by comparing model estimates against the simulated ground truth.</a:t>
+            </a:r>
+          </a:p>
+        </p:txBody>
+      </p:sp>
     </p:spTree>
     <p:extLst>
       <p:ext uri="{BB962C8B-B14F-4D97-AF65-F5344CB8AC3E}">
@@ -4833,11 +4854,12 @@
 </file>
 
 <file path=customXml/item1.xml><?xml version="1.0" encoding="utf-8"?>
-<p:properties xmlns:p="http://schemas.microsoft.com/office/2006/metadata/properties" xmlns:xsi="http://www.w3.org/2001/XMLSchema-instance" xmlns:pc="http://schemas.microsoft.com/office/infopath/2007/PartnerControls">
-  <documentManagement>
-    <_activity xmlns="a26ba5a4-dc13-4f1e-aecf-f7e657dee8a6" xsi:nil="true"/>
-  </documentManagement>
-</p:properties>
+<?mso-contentType ?>
+<FormTemplates xmlns="http://schemas.microsoft.com/sharepoint/v3/contenttype/forms">
+  <Display>DocumentLibraryForm</Display>
+  <Edit>DocumentLibraryForm</Edit>
+  <New>DocumentLibraryForm</New>
+</FormTemplates>
 </file>
 
 <file path=customXml/item2.xml><?xml version="1.0" encoding="utf-8"?>
@@ -5056,27 +5078,17 @@
 </file>
 
 <file path=customXml/item3.xml><?xml version="1.0" encoding="utf-8"?>
-<?mso-contentType ?>
-<FormTemplates xmlns="http://schemas.microsoft.com/sharepoint/v3/contenttype/forms">
-  <Display>DocumentLibraryForm</Display>
-  <Edit>DocumentLibraryForm</Edit>
-  <New>DocumentLibraryForm</New>
-</FormTemplates>
+<p:properties xmlns:p="http://schemas.microsoft.com/office/2006/metadata/properties" xmlns:xsi="http://www.w3.org/2001/XMLSchema-instance" xmlns:pc="http://schemas.microsoft.com/office/infopath/2007/PartnerControls">
+  <documentManagement>
+    <_activity xmlns="a26ba5a4-dc13-4f1e-aecf-f7e657dee8a6" xsi:nil="true"/>
+  </documentManagement>
+</p:properties>
 </file>
 
 <file path=customXml/itemProps1.xml><?xml version="1.0" encoding="utf-8"?>
-<ds:datastoreItem xmlns:ds="http://schemas.openxmlformats.org/officeDocument/2006/customXml" ds:itemID="{1C1A2FBD-ED05-471F-AE6A-779A5CA194C5}">
+<ds:datastoreItem xmlns:ds="http://schemas.openxmlformats.org/officeDocument/2006/customXml" ds:itemID="{3783BBC4-ED4A-4B64-9F7C-4A7EF0EFBA93}">
   <ds:schemaRefs>
-    <ds:schemaRef ds:uri="http://www.w3.org/XML/1998/namespace"/>
-    <ds:schemaRef ds:uri="http://purl.org/dc/dcmitype/"/>
-    <ds:schemaRef ds:uri="http://schemas.microsoft.com/office/infopath/2007/PartnerControls"/>
-    <ds:schemaRef ds:uri="http://purl.org/dc/elements/1.1/"/>
-    <ds:schemaRef ds:uri="http://schemas.openxmlformats.org/package/2006/metadata/core-properties"/>
-    <ds:schemaRef ds:uri="http://schemas.microsoft.com/office/2006/metadata/properties"/>
-    <ds:schemaRef ds:uri="http://schemas.microsoft.com/office/2006/documentManagement/types"/>
-    <ds:schemaRef ds:uri="0f87e38d-5a79-4823-9784-f16a8415b53b"/>
-    <ds:schemaRef ds:uri="a26ba5a4-dc13-4f1e-aecf-f7e657dee8a6"/>
-    <ds:schemaRef ds:uri="http://purl.org/dc/terms/"/>
+    <ds:schemaRef ds:uri="http://schemas.microsoft.com/sharepoint/v3/contenttype/forms"/>
   </ds:schemaRefs>
 </ds:datastoreItem>
 </file>
@@ -5101,9 +5113,18 @@
 </file>
 
 <file path=customXml/itemProps3.xml><?xml version="1.0" encoding="utf-8"?>
-<ds:datastoreItem xmlns:ds="http://schemas.openxmlformats.org/officeDocument/2006/customXml" ds:itemID="{3783BBC4-ED4A-4B64-9F7C-4A7EF0EFBA93}">
+<ds:datastoreItem xmlns:ds="http://schemas.openxmlformats.org/officeDocument/2006/customXml" ds:itemID="{1C1A2FBD-ED05-471F-AE6A-779A5CA194C5}">
   <ds:schemaRefs>
-    <ds:schemaRef ds:uri="http://schemas.microsoft.com/sharepoint/v3/contenttype/forms"/>
+    <ds:schemaRef ds:uri="http://www.w3.org/XML/1998/namespace"/>
+    <ds:schemaRef ds:uri="http://purl.org/dc/dcmitype/"/>
+    <ds:schemaRef ds:uri="http://schemas.microsoft.com/office/infopath/2007/PartnerControls"/>
+    <ds:schemaRef ds:uri="http://purl.org/dc/elements/1.1/"/>
+    <ds:schemaRef ds:uri="http://schemas.openxmlformats.org/package/2006/metadata/core-properties"/>
+    <ds:schemaRef ds:uri="http://schemas.microsoft.com/office/2006/metadata/properties"/>
+    <ds:schemaRef ds:uri="http://schemas.microsoft.com/office/2006/documentManagement/types"/>
+    <ds:schemaRef ds:uri="0f87e38d-5a79-4823-9784-f16a8415b53b"/>
+    <ds:schemaRef ds:uri="a26ba5a4-dc13-4f1e-aecf-f7e657dee8a6"/>
+    <ds:schemaRef ds:uri="http://purl.org/dc/terms/"/>
   </ds:schemaRefs>
 </ds:datastoreItem>
 </file>

</xml_diff>